<commit_message>
Updated some notation of  figures
updated docx or ppt , fig4_newfile of: new_fig1, new_fig2, fig3_new
</commit_message>
<xml_diff>
--- a/StudentGuideModule1/elec_grav/elec_grav_fig4_new.pptx
+++ b/StudentGuideModule1/elec_grav/elec_grav_fig4_new.pptx
@@ -107,6 +107,11 @@
       </a:defRPr>
     </a:lvl9pPr>
   </p:defaultTextStyle>
+  <p:extLst>
+    <p:ext uri="{EFAFB233-063F-42B5-8137-9DF3F51BA10A}">
+      <p15:sldGuideLst xmlns:p15="http://schemas.microsoft.com/office/powerpoint/2012/main"/>
+    </p:ext>
+  </p:extLst>
 </p:presentation>
 </file>
 
@@ -192,7 +197,7 @@
           <a:p>
             <a:fld id="{02A8BB48-C61F-421C-ACFA-F5521FD26ED4}" type="datetimeFigureOut">
               <a:rPr lang="en-US" smtClean="0"/>
-              <a:t>5/21/2016</a:t>
+              <a:t>7/23/2019</a:t>
             </a:fld>
             <a:endParaRPr lang="en-US"/>
           </a:p>
@@ -256,38 +261,37 @@
           <a:p>
             <a:pPr lvl="0"/>
             <a:r>
-              <a:rPr lang="en-US" smtClean="0"/>
+              <a:rPr lang="en-US"/>
               <a:t>Edit Master text styles</a:t>
             </a:r>
           </a:p>
           <a:p>
             <a:pPr lvl="1"/>
             <a:r>
-              <a:rPr lang="en-US" smtClean="0"/>
+              <a:rPr lang="en-US"/>
               <a:t>Second level</a:t>
             </a:r>
           </a:p>
           <a:p>
             <a:pPr lvl="2"/>
             <a:r>
-              <a:rPr lang="en-US" smtClean="0"/>
+              <a:rPr lang="en-US"/>
               <a:t>Third level</a:t>
             </a:r>
           </a:p>
           <a:p>
             <a:pPr lvl="3"/>
             <a:r>
-              <a:rPr lang="en-US" smtClean="0"/>
+              <a:rPr lang="en-US"/>
               <a:t>Fourth level</a:t>
             </a:r>
           </a:p>
           <a:p>
             <a:pPr lvl="4"/>
             <a:r>
-              <a:rPr lang="en-US" smtClean="0"/>
+              <a:rPr lang="en-US"/>
               <a:t>Fifth level</a:t>
             </a:r>
-            <a:endParaRPr lang="en-US"/>
           </a:p>
         </p:txBody>
       </p:sp>
@@ -586,10 +590,9 @@
           </a:lstStyle>
           <a:p>
             <a:r>
-              <a:rPr lang="en-US" smtClean="0"/>
+              <a:rPr lang="en-US"/>
               <a:t>Click to edit Master title style</a:t>
             </a:r>
-            <a:endParaRPr lang="en-US"/>
           </a:p>
         </p:txBody>
       </p:sp>
@@ -651,10 +654,9 @@
           </a:lstStyle>
           <a:p>
             <a:r>
-              <a:rPr lang="en-US" smtClean="0"/>
+              <a:rPr lang="en-US"/>
               <a:t>Click to edit Master subtitle style</a:t>
             </a:r>
-            <a:endParaRPr lang="en-US"/>
           </a:p>
         </p:txBody>
       </p:sp>
@@ -675,7 +677,7 @@
           <a:p>
             <a:fld id="{032F34AF-3333-49B4-9DCB-ACFC3E753053}" type="datetimeFigureOut">
               <a:rPr lang="en-US" smtClean="0"/>
-              <a:t>5/21/2016</a:t>
+              <a:t>7/23/2019</a:t>
             </a:fld>
             <a:endParaRPr lang="en-US"/>
           </a:p>
@@ -769,10 +771,9 @@
           <a:lstStyle/>
           <a:p>
             <a:r>
-              <a:rPr lang="en-US" smtClean="0"/>
+              <a:rPr lang="en-US"/>
               <a:t>Click to edit Master title style</a:t>
             </a:r>
-            <a:endParaRPr lang="en-US"/>
           </a:p>
         </p:txBody>
       </p:sp>
@@ -793,38 +794,37 @@
           <a:p>
             <a:pPr lvl="0"/>
             <a:r>
-              <a:rPr lang="en-US" smtClean="0"/>
+              <a:rPr lang="en-US"/>
               <a:t>Edit Master text styles</a:t>
             </a:r>
           </a:p>
           <a:p>
             <a:pPr lvl="1"/>
             <a:r>
-              <a:rPr lang="en-US" smtClean="0"/>
+              <a:rPr lang="en-US"/>
               <a:t>Second level</a:t>
             </a:r>
           </a:p>
           <a:p>
             <a:pPr lvl="2"/>
             <a:r>
-              <a:rPr lang="en-US" smtClean="0"/>
+              <a:rPr lang="en-US"/>
               <a:t>Third level</a:t>
             </a:r>
           </a:p>
           <a:p>
             <a:pPr lvl="3"/>
             <a:r>
-              <a:rPr lang="en-US" smtClean="0"/>
+              <a:rPr lang="en-US"/>
               <a:t>Fourth level</a:t>
             </a:r>
           </a:p>
           <a:p>
             <a:pPr lvl="4"/>
             <a:r>
-              <a:rPr lang="en-US" smtClean="0"/>
+              <a:rPr lang="en-US"/>
               <a:t>Fifth level</a:t>
             </a:r>
-            <a:endParaRPr lang="en-US"/>
           </a:p>
         </p:txBody>
       </p:sp>
@@ -845,7 +845,7 @@
           <a:p>
             <a:fld id="{032F34AF-3333-49B4-9DCB-ACFC3E753053}" type="datetimeFigureOut">
               <a:rPr lang="en-US" smtClean="0"/>
-              <a:t>5/21/2016</a:t>
+              <a:t>7/23/2019</a:t>
             </a:fld>
             <a:endParaRPr lang="en-US"/>
           </a:p>
@@ -944,10 +944,9 @@
           <a:lstStyle/>
           <a:p>
             <a:r>
-              <a:rPr lang="en-US" smtClean="0"/>
+              <a:rPr lang="en-US"/>
               <a:t>Click to edit Master title style</a:t>
             </a:r>
-            <a:endParaRPr lang="en-US"/>
           </a:p>
         </p:txBody>
       </p:sp>
@@ -973,38 +972,37 @@
           <a:p>
             <a:pPr lvl="0"/>
             <a:r>
-              <a:rPr lang="en-US" smtClean="0"/>
+              <a:rPr lang="en-US"/>
               <a:t>Edit Master text styles</a:t>
             </a:r>
           </a:p>
           <a:p>
             <a:pPr lvl="1"/>
             <a:r>
-              <a:rPr lang="en-US" smtClean="0"/>
+              <a:rPr lang="en-US"/>
               <a:t>Second level</a:t>
             </a:r>
           </a:p>
           <a:p>
             <a:pPr lvl="2"/>
             <a:r>
-              <a:rPr lang="en-US" smtClean="0"/>
+              <a:rPr lang="en-US"/>
               <a:t>Third level</a:t>
             </a:r>
           </a:p>
           <a:p>
             <a:pPr lvl="3"/>
             <a:r>
-              <a:rPr lang="en-US" smtClean="0"/>
+              <a:rPr lang="en-US"/>
               <a:t>Fourth level</a:t>
             </a:r>
           </a:p>
           <a:p>
             <a:pPr lvl="4"/>
             <a:r>
-              <a:rPr lang="en-US" smtClean="0"/>
+              <a:rPr lang="en-US"/>
               <a:t>Fifth level</a:t>
             </a:r>
-            <a:endParaRPr lang="en-US"/>
           </a:p>
         </p:txBody>
       </p:sp>
@@ -1025,7 +1023,7 @@
           <a:p>
             <a:fld id="{032F34AF-3333-49B4-9DCB-ACFC3E753053}" type="datetimeFigureOut">
               <a:rPr lang="en-US" smtClean="0"/>
-              <a:t>5/21/2016</a:t>
+              <a:t>7/23/2019</a:t>
             </a:fld>
             <a:endParaRPr lang="en-US"/>
           </a:p>
@@ -1119,10 +1117,9 @@
           <a:lstStyle/>
           <a:p>
             <a:r>
-              <a:rPr lang="en-US" smtClean="0"/>
+              <a:rPr lang="en-US"/>
               <a:t>Click to edit Master title style</a:t>
             </a:r>
-            <a:endParaRPr lang="en-US"/>
           </a:p>
         </p:txBody>
       </p:sp>
@@ -1143,38 +1140,37 @@
           <a:p>
             <a:pPr lvl="0"/>
             <a:r>
-              <a:rPr lang="en-US" smtClean="0"/>
+              <a:rPr lang="en-US"/>
               <a:t>Edit Master text styles</a:t>
             </a:r>
           </a:p>
           <a:p>
             <a:pPr lvl="1"/>
             <a:r>
-              <a:rPr lang="en-US" smtClean="0"/>
+              <a:rPr lang="en-US"/>
               <a:t>Second level</a:t>
             </a:r>
           </a:p>
           <a:p>
             <a:pPr lvl="2"/>
             <a:r>
-              <a:rPr lang="en-US" smtClean="0"/>
+              <a:rPr lang="en-US"/>
               <a:t>Third level</a:t>
             </a:r>
           </a:p>
           <a:p>
             <a:pPr lvl="3"/>
             <a:r>
-              <a:rPr lang="en-US" smtClean="0"/>
+              <a:rPr lang="en-US"/>
               <a:t>Fourth level</a:t>
             </a:r>
           </a:p>
           <a:p>
             <a:pPr lvl="4"/>
             <a:r>
-              <a:rPr lang="en-US" smtClean="0"/>
+              <a:rPr lang="en-US"/>
               <a:t>Fifth level</a:t>
             </a:r>
-            <a:endParaRPr lang="en-US"/>
           </a:p>
         </p:txBody>
       </p:sp>
@@ -1195,7 +1191,7 @@
           <a:p>
             <a:fld id="{032F34AF-3333-49B4-9DCB-ACFC3E753053}" type="datetimeFigureOut">
               <a:rPr lang="en-US" smtClean="0"/>
-              <a:t>5/21/2016</a:t>
+              <a:t>7/23/2019</a:t>
             </a:fld>
             <a:endParaRPr lang="en-US"/>
           </a:p>
@@ -1298,10 +1294,9 @@
           </a:lstStyle>
           <a:p>
             <a:r>
-              <a:rPr lang="en-US" smtClean="0"/>
+              <a:rPr lang="en-US"/>
               <a:t>Click to edit Master title style</a:t>
             </a:r>
-            <a:endParaRPr lang="en-US"/>
           </a:p>
         </p:txBody>
       </p:sp>
@@ -1418,7 +1413,7 @@
           <a:p>
             <a:pPr lvl="0"/>
             <a:r>
-              <a:rPr lang="en-US" smtClean="0"/>
+              <a:rPr lang="en-US"/>
               <a:t>Edit Master text styles</a:t>
             </a:r>
           </a:p>
@@ -1441,7 +1436,7 @@
           <a:p>
             <a:fld id="{032F34AF-3333-49B4-9DCB-ACFC3E753053}" type="datetimeFigureOut">
               <a:rPr lang="en-US" smtClean="0"/>
-              <a:t>5/21/2016</a:t>
+              <a:t>7/23/2019</a:t>
             </a:fld>
             <a:endParaRPr lang="en-US"/>
           </a:p>
@@ -1535,10 +1530,9 @@
           <a:lstStyle/>
           <a:p>
             <a:r>
-              <a:rPr lang="en-US" smtClean="0"/>
+              <a:rPr lang="en-US"/>
               <a:t>Click to edit Master title style</a:t>
             </a:r>
-            <a:endParaRPr lang="en-US"/>
           </a:p>
         </p:txBody>
       </p:sp>
@@ -1564,38 +1558,37 @@
           <a:p>
             <a:pPr lvl="0"/>
             <a:r>
-              <a:rPr lang="en-US" smtClean="0"/>
+              <a:rPr lang="en-US"/>
               <a:t>Edit Master text styles</a:t>
             </a:r>
           </a:p>
           <a:p>
             <a:pPr lvl="1"/>
             <a:r>
-              <a:rPr lang="en-US" smtClean="0"/>
+              <a:rPr lang="en-US"/>
               <a:t>Second level</a:t>
             </a:r>
           </a:p>
           <a:p>
             <a:pPr lvl="2"/>
             <a:r>
-              <a:rPr lang="en-US" smtClean="0"/>
+              <a:rPr lang="en-US"/>
               <a:t>Third level</a:t>
             </a:r>
           </a:p>
           <a:p>
             <a:pPr lvl="3"/>
             <a:r>
-              <a:rPr lang="en-US" smtClean="0"/>
+              <a:rPr lang="en-US"/>
               <a:t>Fourth level</a:t>
             </a:r>
           </a:p>
           <a:p>
             <a:pPr lvl="4"/>
             <a:r>
-              <a:rPr lang="en-US" smtClean="0"/>
+              <a:rPr lang="en-US"/>
               <a:t>Fifth level</a:t>
             </a:r>
-            <a:endParaRPr lang="en-US"/>
           </a:p>
         </p:txBody>
       </p:sp>
@@ -1621,38 +1614,37 @@
           <a:p>
             <a:pPr lvl="0"/>
             <a:r>
-              <a:rPr lang="en-US" smtClean="0"/>
+              <a:rPr lang="en-US"/>
               <a:t>Edit Master text styles</a:t>
             </a:r>
           </a:p>
           <a:p>
             <a:pPr lvl="1"/>
             <a:r>
-              <a:rPr lang="en-US" smtClean="0"/>
+              <a:rPr lang="en-US"/>
               <a:t>Second level</a:t>
             </a:r>
           </a:p>
           <a:p>
             <a:pPr lvl="2"/>
             <a:r>
-              <a:rPr lang="en-US" smtClean="0"/>
+              <a:rPr lang="en-US"/>
               <a:t>Third level</a:t>
             </a:r>
           </a:p>
           <a:p>
             <a:pPr lvl="3"/>
             <a:r>
-              <a:rPr lang="en-US" smtClean="0"/>
+              <a:rPr lang="en-US"/>
               <a:t>Fourth level</a:t>
             </a:r>
           </a:p>
           <a:p>
             <a:pPr lvl="4"/>
             <a:r>
-              <a:rPr lang="en-US" smtClean="0"/>
+              <a:rPr lang="en-US"/>
               <a:t>Fifth level</a:t>
             </a:r>
-            <a:endParaRPr lang="en-US"/>
           </a:p>
         </p:txBody>
       </p:sp>
@@ -1673,7 +1665,7 @@
           <a:p>
             <a:fld id="{032F34AF-3333-49B4-9DCB-ACFC3E753053}" type="datetimeFigureOut">
               <a:rPr lang="en-US" smtClean="0"/>
-              <a:t>5/21/2016</a:t>
+              <a:t>7/23/2019</a:t>
             </a:fld>
             <a:endParaRPr lang="en-US"/>
           </a:p>
@@ -1772,10 +1764,9 @@
           <a:lstStyle/>
           <a:p>
             <a:r>
-              <a:rPr lang="en-US" smtClean="0"/>
+              <a:rPr lang="en-US"/>
               <a:t>Click to edit Master title style</a:t>
             </a:r>
-            <a:endParaRPr lang="en-US"/>
           </a:p>
         </p:txBody>
       </p:sp>
@@ -1838,7 +1829,7 @@
           <a:p>
             <a:pPr lvl="0"/>
             <a:r>
-              <a:rPr lang="en-US" smtClean="0"/>
+              <a:rPr lang="en-US"/>
               <a:t>Edit Master text styles</a:t>
             </a:r>
           </a:p>
@@ -1866,38 +1857,37 @@
           <a:p>
             <a:pPr lvl="0"/>
             <a:r>
-              <a:rPr lang="en-US" smtClean="0"/>
+              <a:rPr lang="en-US"/>
               <a:t>Edit Master text styles</a:t>
             </a:r>
           </a:p>
           <a:p>
             <a:pPr lvl="1"/>
             <a:r>
-              <a:rPr lang="en-US" smtClean="0"/>
+              <a:rPr lang="en-US"/>
               <a:t>Second level</a:t>
             </a:r>
           </a:p>
           <a:p>
             <a:pPr lvl="2"/>
             <a:r>
-              <a:rPr lang="en-US" smtClean="0"/>
+              <a:rPr lang="en-US"/>
               <a:t>Third level</a:t>
             </a:r>
           </a:p>
           <a:p>
             <a:pPr lvl="3"/>
             <a:r>
-              <a:rPr lang="en-US" smtClean="0"/>
+              <a:rPr lang="en-US"/>
               <a:t>Fourth level</a:t>
             </a:r>
           </a:p>
           <a:p>
             <a:pPr lvl="4"/>
             <a:r>
-              <a:rPr lang="en-US" smtClean="0"/>
+              <a:rPr lang="en-US"/>
               <a:t>Fifth level</a:t>
             </a:r>
-            <a:endParaRPr lang="en-US"/>
           </a:p>
         </p:txBody>
       </p:sp>
@@ -1960,7 +1950,7 @@
           <a:p>
             <a:pPr lvl="0"/>
             <a:r>
-              <a:rPr lang="en-US" smtClean="0"/>
+              <a:rPr lang="en-US"/>
               <a:t>Edit Master text styles</a:t>
             </a:r>
           </a:p>
@@ -1988,38 +1978,37 @@
           <a:p>
             <a:pPr lvl="0"/>
             <a:r>
-              <a:rPr lang="en-US" smtClean="0"/>
+              <a:rPr lang="en-US"/>
               <a:t>Edit Master text styles</a:t>
             </a:r>
           </a:p>
           <a:p>
             <a:pPr lvl="1"/>
             <a:r>
-              <a:rPr lang="en-US" smtClean="0"/>
+              <a:rPr lang="en-US"/>
               <a:t>Second level</a:t>
             </a:r>
           </a:p>
           <a:p>
             <a:pPr lvl="2"/>
             <a:r>
-              <a:rPr lang="en-US" smtClean="0"/>
+              <a:rPr lang="en-US"/>
               <a:t>Third level</a:t>
             </a:r>
           </a:p>
           <a:p>
             <a:pPr lvl="3"/>
             <a:r>
-              <a:rPr lang="en-US" smtClean="0"/>
+              <a:rPr lang="en-US"/>
               <a:t>Fourth level</a:t>
             </a:r>
           </a:p>
           <a:p>
             <a:pPr lvl="4"/>
             <a:r>
-              <a:rPr lang="en-US" smtClean="0"/>
+              <a:rPr lang="en-US"/>
               <a:t>Fifth level</a:t>
             </a:r>
-            <a:endParaRPr lang="en-US"/>
           </a:p>
         </p:txBody>
       </p:sp>
@@ -2040,7 +2029,7 @@
           <a:p>
             <a:fld id="{032F34AF-3333-49B4-9DCB-ACFC3E753053}" type="datetimeFigureOut">
               <a:rPr lang="en-US" smtClean="0"/>
-              <a:t>5/21/2016</a:t>
+              <a:t>7/23/2019</a:t>
             </a:fld>
             <a:endParaRPr lang="en-US"/>
           </a:p>
@@ -2134,10 +2123,9 @@
           <a:lstStyle/>
           <a:p>
             <a:r>
-              <a:rPr lang="en-US" smtClean="0"/>
+              <a:rPr lang="en-US"/>
               <a:t>Click to edit Master title style</a:t>
             </a:r>
-            <a:endParaRPr lang="en-US"/>
           </a:p>
         </p:txBody>
       </p:sp>
@@ -2158,7 +2146,7 @@
           <a:p>
             <a:fld id="{032F34AF-3333-49B4-9DCB-ACFC3E753053}" type="datetimeFigureOut">
               <a:rPr lang="en-US" smtClean="0"/>
-              <a:t>5/21/2016</a:t>
+              <a:t>7/23/2019</a:t>
             </a:fld>
             <a:endParaRPr lang="en-US"/>
           </a:p>
@@ -2253,7 +2241,7 @@
           <a:p>
             <a:fld id="{032F34AF-3333-49B4-9DCB-ACFC3E753053}" type="datetimeFigureOut">
               <a:rPr lang="en-US" smtClean="0"/>
-              <a:t>5/21/2016</a:t>
+              <a:t>7/23/2019</a:t>
             </a:fld>
             <a:endParaRPr lang="en-US"/>
           </a:p>
@@ -2356,10 +2344,9 @@
           </a:lstStyle>
           <a:p>
             <a:r>
-              <a:rPr lang="en-US" smtClean="0"/>
+              <a:rPr lang="en-US"/>
               <a:t>Click to edit Master title style</a:t>
             </a:r>
-            <a:endParaRPr lang="en-US"/>
           </a:p>
         </p:txBody>
       </p:sp>
@@ -2413,38 +2400,37 @@
           <a:p>
             <a:pPr lvl="0"/>
             <a:r>
-              <a:rPr lang="en-US" smtClean="0"/>
+              <a:rPr lang="en-US"/>
               <a:t>Edit Master text styles</a:t>
             </a:r>
           </a:p>
           <a:p>
             <a:pPr lvl="1"/>
             <a:r>
-              <a:rPr lang="en-US" smtClean="0"/>
+              <a:rPr lang="en-US"/>
               <a:t>Second level</a:t>
             </a:r>
           </a:p>
           <a:p>
             <a:pPr lvl="2"/>
             <a:r>
-              <a:rPr lang="en-US" smtClean="0"/>
+              <a:rPr lang="en-US"/>
               <a:t>Third level</a:t>
             </a:r>
           </a:p>
           <a:p>
             <a:pPr lvl="3"/>
             <a:r>
-              <a:rPr lang="en-US" smtClean="0"/>
+              <a:rPr lang="en-US"/>
               <a:t>Fourth level</a:t>
             </a:r>
           </a:p>
           <a:p>
             <a:pPr lvl="4"/>
             <a:r>
-              <a:rPr lang="en-US" smtClean="0"/>
+              <a:rPr lang="en-US"/>
               <a:t>Fifth level</a:t>
             </a:r>
-            <a:endParaRPr lang="en-US"/>
           </a:p>
         </p:txBody>
       </p:sp>
@@ -2507,7 +2493,7 @@
           <a:p>
             <a:pPr lvl="0"/>
             <a:r>
-              <a:rPr lang="en-US" smtClean="0"/>
+              <a:rPr lang="en-US"/>
               <a:t>Edit Master text styles</a:t>
             </a:r>
           </a:p>
@@ -2530,7 +2516,7 @@
           <a:p>
             <a:fld id="{032F34AF-3333-49B4-9DCB-ACFC3E753053}" type="datetimeFigureOut">
               <a:rPr lang="en-US" smtClean="0"/>
-              <a:t>5/21/2016</a:t>
+              <a:t>7/23/2019</a:t>
             </a:fld>
             <a:endParaRPr lang="en-US"/>
           </a:p>
@@ -2633,10 +2619,9 @@
           </a:lstStyle>
           <a:p>
             <a:r>
-              <a:rPr lang="en-US" smtClean="0"/>
+              <a:rPr lang="en-US"/>
               <a:t>Click to edit Master title style</a:t>
             </a:r>
-            <a:endParaRPr lang="en-US"/>
           </a:p>
         </p:txBody>
       </p:sp>
@@ -2760,7 +2745,7 @@
           <a:p>
             <a:pPr lvl="0"/>
             <a:r>
-              <a:rPr lang="en-US" smtClean="0"/>
+              <a:rPr lang="en-US"/>
               <a:t>Edit Master text styles</a:t>
             </a:r>
           </a:p>
@@ -2783,7 +2768,7 @@
           <a:p>
             <a:fld id="{032F34AF-3333-49B4-9DCB-ACFC3E753053}" type="datetimeFigureOut">
               <a:rPr lang="en-US" smtClean="0"/>
-              <a:t>5/21/2016</a:t>
+              <a:t>7/23/2019</a:t>
             </a:fld>
             <a:endParaRPr lang="en-US"/>
           </a:p>
@@ -2892,10 +2877,9 @@
           <a:lstStyle/>
           <a:p>
             <a:r>
-              <a:rPr lang="en-US" smtClean="0"/>
+              <a:rPr lang="en-US"/>
               <a:t>Click to edit Master title style</a:t>
             </a:r>
-            <a:endParaRPr lang="en-US"/>
           </a:p>
         </p:txBody>
       </p:sp>
@@ -2926,38 +2910,37 @@
           <a:p>
             <a:pPr lvl="0"/>
             <a:r>
-              <a:rPr lang="en-US" smtClean="0"/>
+              <a:rPr lang="en-US"/>
               <a:t>Edit Master text styles</a:t>
             </a:r>
           </a:p>
           <a:p>
             <a:pPr lvl="1"/>
             <a:r>
-              <a:rPr lang="en-US" smtClean="0"/>
+              <a:rPr lang="en-US"/>
               <a:t>Second level</a:t>
             </a:r>
           </a:p>
           <a:p>
             <a:pPr lvl="2"/>
             <a:r>
-              <a:rPr lang="en-US" smtClean="0"/>
+              <a:rPr lang="en-US"/>
               <a:t>Third level</a:t>
             </a:r>
           </a:p>
           <a:p>
             <a:pPr lvl="3"/>
             <a:r>
-              <a:rPr lang="en-US" smtClean="0"/>
+              <a:rPr lang="en-US"/>
               <a:t>Fourth level</a:t>
             </a:r>
           </a:p>
           <a:p>
             <a:pPr lvl="4"/>
             <a:r>
-              <a:rPr lang="en-US" smtClean="0"/>
+              <a:rPr lang="en-US"/>
               <a:t>Fifth level</a:t>
             </a:r>
-            <a:endParaRPr lang="en-US"/>
           </a:p>
         </p:txBody>
       </p:sp>
@@ -2996,7 +2979,7 @@
           <a:p>
             <a:fld id="{032F34AF-3333-49B4-9DCB-ACFC3E753053}" type="datetimeFigureOut">
               <a:rPr lang="en-US" smtClean="0"/>
-              <a:t>5/21/2016</a:t>
+              <a:t>7/23/2019</a:t>
             </a:fld>
             <a:endParaRPr lang="en-US"/>
           </a:p>
@@ -3702,8 +3685,8 @@
           </a:p>
         </p:txBody>
       </p:sp>
-      <mc:AlternateContent xmlns:mc="http://schemas.openxmlformats.org/markup-compatibility/2006">
-        <mc:Choice xmlns:a14="http://schemas.microsoft.com/office/drawing/2010/main" Requires="a14">
+      <mc:AlternateContent xmlns:mc="http://schemas.openxmlformats.org/markup-compatibility/2006" xmlns:a14="http://schemas.microsoft.com/office/drawing/2010/main">
+        <mc:Choice Requires="a14">
           <p:sp>
             <p:nvSpPr>
               <p:cNvPr id="21" name="TextBox 20"/>
@@ -3771,15 +3754,14 @@
                   </m:oMath>
                 </a14:m>
                 <a:r>
-                  <a:rPr lang="en-US" sz="1200" dirty="0" smtClean="0"/>
+                  <a:rPr lang="en-US" sz="1200" dirty="0"/>
                   <a:t> </a:t>
                 </a:r>
-                <a:endParaRPr lang="en-US" sz="1200" dirty="0"/>
               </a:p>
             </p:txBody>
           </p:sp>
         </mc:Choice>
-        <mc:Fallback>
+        <mc:Fallback xmlns="">
           <p:sp>
             <p:nvSpPr>
               <p:cNvPr id="21" name="TextBox 20"/>
@@ -3821,8 +3803,8 @@
           </p:sp>
         </mc:Fallback>
       </mc:AlternateContent>
-      <mc:AlternateContent xmlns:mc="http://schemas.openxmlformats.org/markup-compatibility/2006">
-        <mc:Choice xmlns:a14="http://schemas.microsoft.com/office/drawing/2010/main" Requires="a14">
+      <mc:AlternateContent xmlns:mc="http://schemas.openxmlformats.org/markup-compatibility/2006" xmlns:a14="http://schemas.microsoft.com/office/drawing/2010/main">
+        <mc:Choice Requires="a14">
           <p:sp>
             <p:nvSpPr>
               <p:cNvPr id="22" name="TextBox 21"/>
@@ -3878,15 +3860,14 @@
                   </m:oMath>
                 </a14:m>
                 <a:r>
-                  <a:rPr lang="en-US" sz="1200" dirty="0" smtClean="0"/>
+                  <a:rPr lang="en-US" sz="1200" dirty="0"/>
                   <a:t> </a:t>
                 </a:r>
-                <a:endParaRPr lang="en-US" sz="1200" dirty="0"/>
               </a:p>
             </p:txBody>
           </p:sp>
         </mc:Choice>
-        <mc:Fallback>
+        <mc:Fallback xmlns="">
           <p:sp>
             <p:nvSpPr>
               <p:cNvPr id="22" name="TextBox 21"/>
@@ -3928,8 +3909,8 @@
           </p:sp>
         </mc:Fallback>
       </mc:AlternateContent>
-      <mc:AlternateContent xmlns:mc="http://schemas.openxmlformats.org/markup-compatibility/2006">
-        <mc:Choice xmlns:a14="http://schemas.microsoft.com/office/drawing/2010/main" Requires="a14">
+      <mc:AlternateContent xmlns:mc="http://schemas.openxmlformats.org/markup-compatibility/2006" xmlns:a14="http://schemas.microsoft.com/office/drawing/2010/main">
+        <mc:Choice Requires="a14">
           <p:sp>
             <p:nvSpPr>
               <p:cNvPr id="23" name="TextBox 22"/>
@@ -3985,15 +3966,14 @@
                   </m:oMath>
                 </a14:m>
                 <a:r>
-                  <a:rPr lang="en-US" sz="1200" dirty="0" smtClean="0"/>
+                  <a:rPr lang="en-US" sz="1200" dirty="0"/>
                   <a:t> </a:t>
                 </a:r>
-                <a:endParaRPr lang="en-US" sz="1200" dirty="0"/>
               </a:p>
             </p:txBody>
           </p:sp>
         </mc:Choice>
-        <mc:Fallback>
+        <mc:Fallback xmlns="">
           <p:sp>
             <p:nvSpPr>
               <p:cNvPr id="23" name="TextBox 22"/>
@@ -4061,10 +4041,9 @@
           <a:lstStyle/>
           <a:p>
             <a:r>
-              <a:rPr lang="en-US" sz="1200" dirty="0" smtClean="0"/>
+              <a:rPr lang="en-US" sz="1200" dirty="0"/>
               <a:t>unit vector </a:t>
             </a:r>
-            <a:endParaRPr lang="en-US" sz="1200" dirty="0"/>
           </a:p>
         </p:txBody>
       </p:sp>
@@ -4093,7 +4072,7 @@
               <p:spPr>
                 <a:xfrm>
                   <a:off x="2689541" y="1464950"/>
-                  <a:ext cx="1547179" cy="407356"/>
+                  <a:ext cx="1780904" cy="407356"/>
                 </a:xfrm>
                 <a:prstGeom prst="rect">
                   <a:avLst/>
@@ -4109,6 +4088,7 @@
                 </a:bodyPr>
                 <a:lstStyle/>
                 <a:p>
+                  <a:pPr/>
                   <a14:m>
                     <m:oMathPara xmlns:m="http://schemas.openxmlformats.org/officeDocument/2006/math">
                       <m:oMathParaPr>
@@ -4148,7 +4128,34 @@
                               <a:rPr lang="en-US" sz="1200" b="0" i="1" smtClean="0">
                                 <a:latin typeface="Cambria Math" panose="02040503050406030204" pitchFamily="18" charset="0"/>
                               </a:rPr>
-                              <m:t>12</m:t>
+                              <m:t>1</m:t>
+                            </m:r>
+                            <m:r>
+                              <a:rPr lang="en-US" sz="1200" b="0" i="1" smtClean="0">
+                                <a:latin typeface="Cambria Math" panose="02040503050406030204" pitchFamily="18" charset="0"/>
+                              </a:rPr>
+                              <m:t> </m:t>
+                            </m:r>
+                            <m:r>
+                              <m:rPr>
+                                <m:sty m:val="p"/>
+                              </m:rPr>
+                              <a:rPr lang="en-US" sz="1200" b="0" i="0" smtClean="0">
+                                <a:latin typeface="Cambria Math" panose="02040503050406030204" pitchFamily="18" charset="0"/>
+                              </a:rPr>
+                              <m:t>on</m:t>
+                            </m:r>
+                            <m:r>
+                              <a:rPr lang="en-US" sz="1200" b="0" i="1" smtClean="0">
+                                <a:latin typeface="Cambria Math" panose="02040503050406030204" pitchFamily="18" charset="0"/>
+                              </a:rPr>
+                              <m:t> </m:t>
+                            </m:r>
+                            <m:r>
+                              <a:rPr lang="en-US" sz="1200" b="0" i="1" smtClean="0">
+                                <a:latin typeface="Cambria Math" panose="02040503050406030204" pitchFamily="18" charset="0"/>
+                              </a:rPr>
+                              <m:t>2</m:t>
                             </m:r>
                           </m:sub>
                         </m:sSub>
@@ -4292,7 +4299,7 @@
                       </m:oMath>
                     </m:oMathPara>
                   </a14:m>
-                  <a:endParaRPr lang="en-US" sz="1200" b="0" dirty="0" smtClean="0"/>
+                  <a:endParaRPr lang="en-US" sz="1200" b="0" dirty="0"/>
                 </a:p>
               </p:txBody>
             </p:sp>
@@ -4309,7 +4316,7 @@
               <p:spPr>
                 <a:xfrm>
                   <a:off x="2689541" y="1464950"/>
-                  <a:ext cx="1547179" cy="407356"/>
+                  <a:ext cx="1780904" cy="407356"/>
                 </a:xfrm>
                 <a:prstGeom prst="rect">
                   <a:avLst/>
@@ -4339,8 +4346,8 @@
             </p:sp>
           </mc:Fallback>
         </mc:AlternateContent>
-        <mc:AlternateContent xmlns:mc="http://schemas.openxmlformats.org/markup-compatibility/2006">
-          <mc:Choice xmlns:a14="http://schemas.microsoft.com/office/drawing/2010/main" Requires="a14">
+        <mc:AlternateContent xmlns:mc="http://schemas.openxmlformats.org/markup-compatibility/2006" xmlns:a14="http://schemas.microsoft.com/office/drawing/2010/main">
+          <mc:Choice Requires="a14">
             <p:sp>
               <p:nvSpPr>
                 <p:cNvPr id="26" name="TextBox 25"/>
@@ -4366,6 +4373,7 @@
                 </a:bodyPr>
                 <a:lstStyle/>
                 <a:p>
+                  <a:pPr/>
                   <a14:m>
                     <m:oMathPara xmlns:m="http://schemas.openxmlformats.org/officeDocument/2006/math">
                       <m:oMathParaPr>
@@ -4508,7 +4516,7 @@
               </p:txBody>
             </p:sp>
           </mc:Choice>
-          <mc:Fallback>
+          <mc:Fallback xmlns="">
             <p:sp>
               <p:nvSpPr>
                 <p:cNvPr id="26" name="TextBox 25"/>
@@ -4597,8 +4605,8 @@
           </a:p>
         </p:txBody>
       </p:sp>
-      <mc:AlternateContent xmlns:mc="http://schemas.openxmlformats.org/markup-compatibility/2006">
-        <mc:Choice xmlns:a14="http://schemas.microsoft.com/office/drawing/2010/main" Requires="a14">
+      <mc:AlternateContent xmlns:mc="http://schemas.openxmlformats.org/markup-compatibility/2006" xmlns:a14="http://schemas.microsoft.com/office/drawing/2010/main">
+        <mc:Choice Requires="a14">
           <p:sp>
             <p:nvSpPr>
               <p:cNvPr id="20" name="TextBox 19"/>
@@ -4654,15 +4662,14 @@
                   </m:oMath>
                 </a14:m>
                 <a:r>
-                  <a:rPr lang="en-US" sz="1200" dirty="0" smtClean="0"/>
+                  <a:rPr lang="en-US" sz="1200" dirty="0"/>
                   <a:t> </a:t>
                 </a:r>
-                <a:endParaRPr lang="en-US" sz="1200" dirty="0"/>
               </a:p>
             </p:txBody>
           </p:sp>
         </mc:Choice>
-        <mc:Fallback>
+        <mc:Fallback xmlns="">
           <p:sp>
             <p:nvSpPr>
               <p:cNvPr id="20" name="TextBox 19"/>
@@ -4714,13 +4721,6 @@
   <p:clrMapOvr>
     <a:masterClrMapping/>
   </p:clrMapOvr>
-  <p:timing>
-    <p:tnLst>
-      <p:par>
-        <p:cTn id="1" dur="indefinite" restart="never" nodeType="tmRoot"/>
-      </p:par>
-    </p:tnLst>
-  </p:timing>
 </p:sld>
 </file>
 

</xml_diff>

<commit_message>
change in the notation of the figure
</commit_message>
<xml_diff>
--- a/StudentGuideModule1/elec_grav/elec_grav_fig4_new.pptx
+++ b/StudentGuideModule1/elec_grav/elec_grav_fig4_new.pptx
@@ -197,7 +197,7 @@
           <a:p>
             <a:fld id="{02A8BB48-C61F-421C-ACFA-F5521FD26ED4}" type="datetimeFigureOut">
               <a:rPr lang="en-US" smtClean="0"/>
-              <a:t>7/23/2019</a:t>
+              <a:t>7/24/2019</a:t>
             </a:fld>
             <a:endParaRPr lang="en-US"/>
           </a:p>
@@ -677,7 +677,7 @@
           <a:p>
             <a:fld id="{032F34AF-3333-49B4-9DCB-ACFC3E753053}" type="datetimeFigureOut">
               <a:rPr lang="en-US" smtClean="0"/>
-              <a:t>7/23/2019</a:t>
+              <a:t>7/24/2019</a:t>
             </a:fld>
             <a:endParaRPr lang="en-US"/>
           </a:p>
@@ -845,7 +845,7 @@
           <a:p>
             <a:fld id="{032F34AF-3333-49B4-9DCB-ACFC3E753053}" type="datetimeFigureOut">
               <a:rPr lang="en-US" smtClean="0"/>
-              <a:t>7/23/2019</a:t>
+              <a:t>7/24/2019</a:t>
             </a:fld>
             <a:endParaRPr lang="en-US"/>
           </a:p>
@@ -1023,7 +1023,7 @@
           <a:p>
             <a:fld id="{032F34AF-3333-49B4-9DCB-ACFC3E753053}" type="datetimeFigureOut">
               <a:rPr lang="en-US" smtClean="0"/>
-              <a:t>7/23/2019</a:t>
+              <a:t>7/24/2019</a:t>
             </a:fld>
             <a:endParaRPr lang="en-US"/>
           </a:p>
@@ -1191,7 +1191,7 @@
           <a:p>
             <a:fld id="{032F34AF-3333-49B4-9DCB-ACFC3E753053}" type="datetimeFigureOut">
               <a:rPr lang="en-US" smtClean="0"/>
-              <a:t>7/23/2019</a:t>
+              <a:t>7/24/2019</a:t>
             </a:fld>
             <a:endParaRPr lang="en-US"/>
           </a:p>
@@ -1436,7 +1436,7 @@
           <a:p>
             <a:fld id="{032F34AF-3333-49B4-9DCB-ACFC3E753053}" type="datetimeFigureOut">
               <a:rPr lang="en-US" smtClean="0"/>
-              <a:t>7/23/2019</a:t>
+              <a:t>7/24/2019</a:t>
             </a:fld>
             <a:endParaRPr lang="en-US"/>
           </a:p>
@@ -1665,7 +1665,7 @@
           <a:p>
             <a:fld id="{032F34AF-3333-49B4-9DCB-ACFC3E753053}" type="datetimeFigureOut">
               <a:rPr lang="en-US" smtClean="0"/>
-              <a:t>7/23/2019</a:t>
+              <a:t>7/24/2019</a:t>
             </a:fld>
             <a:endParaRPr lang="en-US"/>
           </a:p>
@@ -2029,7 +2029,7 @@
           <a:p>
             <a:fld id="{032F34AF-3333-49B4-9DCB-ACFC3E753053}" type="datetimeFigureOut">
               <a:rPr lang="en-US" smtClean="0"/>
-              <a:t>7/23/2019</a:t>
+              <a:t>7/24/2019</a:t>
             </a:fld>
             <a:endParaRPr lang="en-US"/>
           </a:p>
@@ -2146,7 +2146,7 @@
           <a:p>
             <a:fld id="{032F34AF-3333-49B4-9DCB-ACFC3E753053}" type="datetimeFigureOut">
               <a:rPr lang="en-US" smtClean="0"/>
-              <a:t>7/23/2019</a:t>
+              <a:t>7/24/2019</a:t>
             </a:fld>
             <a:endParaRPr lang="en-US"/>
           </a:p>
@@ -2241,7 +2241,7 @@
           <a:p>
             <a:fld id="{032F34AF-3333-49B4-9DCB-ACFC3E753053}" type="datetimeFigureOut">
               <a:rPr lang="en-US" smtClean="0"/>
-              <a:t>7/23/2019</a:t>
+              <a:t>7/24/2019</a:t>
             </a:fld>
             <a:endParaRPr lang="en-US"/>
           </a:p>
@@ -2516,7 +2516,7 @@
           <a:p>
             <a:fld id="{032F34AF-3333-49B4-9DCB-ACFC3E753053}" type="datetimeFigureOut">
               <a:rPr lang="en-US" smtClean="0"/>
-              <a:t>7/23/2019</a:t>
+              <a:t>7/24/2019</a:t>
             </a:fld>
             <a:endParaRPr lang="en-US"/>
           </a:p>
@@ -2768,7 +2768,7 @@
           <a:p>
             <a:fld id="{032F34AF-3333-49B4-9DCB-ACFC3E753053}" type="datetimeFigureOut">
               <a:rPr lang="en-US" smtClean="0"/>
-              <a:t>7/23/2019</a:t>
+              <a:t>7/24/2019</a:t>
             </a:fld>
             <a:endParaRPr lang="en-US"/>
           </a:p>
@@ -2979,7 +2979,7 @@
           <a:p>
             <a:fld id="{032F34AF-3333-49B4-9DCB-ACFC3E753053}" type="datetimeFigureOut">
               <a:rPr lang="en-US" smtClean="0"/>
-              <a:t>7/23/2019</a:t>
+              <a:t>7/24/2019</a:t>
             </a:fld>
             <a:endParaRPr lang="en-US"/>
           </a:p>
@@ -4061,8 +4061,8 @@
             <a:chExt cx="2263458" cy="703547"/>
           </a:xfrm>
         </p:grpSpPr>
-        <mc:AlternateContent xmlns:mc="http://schemas.openxmlformats.org/markup-compatibility/2006">
-          <mc:Choice xmlns:a14="http://schemas.microsoft.com/office/drawing/2010/main" Requires="a14">
+        <mc:AlternateContent xmlns:mc="http://schemas.openxmlformats.org/markup-compatibility/2006" xmlns:a14="http://schemas.microsoft.com/office/drawing/2010/main">
+          <mc:Choice Requires="a14">
             <p:sp>
               <p:nvSpPr>
                 <p:cNvPr id="25" name="TextBox 24"/>
@@ -4128,13 +4128,7 @@
                               <a:rPr lang="en-US" sz="1200" b="0" i="1" smtClean="0">
                                 <a:latin typeface="Cambria Math" panose="02040503050406030204" pitchFamily="18" charset="0"/>
                               </a:rPr>
-                              <m:t>1</m:t>
-                            </m:r>
-                            <m:r>
-                              <a:rPr lang="en-US" sz="1200" b="0" i="1" smtClean="0">
-                                <a:latin typeface="Cambria Math" panose="02040503050406030204" pitchFamily="18" charset="0"/>
-                              </a:rPr>
-                              <m:t> </m:t>
+                              <m:t>1 </m:t>
                             </m:r>
                             <m:r>
                               <m:rPr>
@@ -4149,13 +4143,7 @@
                               <a:rPr lang="en-US" sz="1200" b="0" i="1" smtClean="0">
                                 <a:latin typeface="Cambria Math" panose="02040503050406030204" pitchFamily="18" charset="0"/>
                               </a:rPr>
-                              <m:t> </m:t>
-                            </m:r>
-                            <m:r>
-                              <a:rPr lang="en-US" sz="1200" b="0" i="1" smtClean="0">
-                                <a:latin typeface="Cambria Math" panose="02040503050406030204" pitchFamily="18" charset="0"/>
-                              </a:rPr>
-                              <m:t>2</m:t>
+                              <m:t> 2</m:t>
                             </m:r>
                           </m:sub>
                         </m:sSub>
@@ -4304,7 +4292,7 @@
               </p:txBody>
             </p:sp>
           </mc:Choice>
-          <mc:Fallback>
+          <mc:Fallback xmlns="">
             <p:sp>
               <p:nvSpPr>
                 <p:cNvPr id="25" name="TextBox 24"/>

</xml_diff>